<commit_message>
presentation add 2 slides
</commit_message>
<xml_diff>
--- a/presentation.pptx
+++ b/presentation.pptx
@@ -3224,7 +3224,7 @@
       </p:grpSpPr>
       <p:sp>
         <p:nvSpPr>
-          <p:cNvPr id="151" name="Бонус, проблема oraсl-ов и почему блокчейн сосет"/>
+          <p:cNvPr id="156" name="Бонус, проблема oraсl-ов и почему блокчейн сосет"/>
           <p:cNvSpPr txBox="1"/>
           <p:nvPr>
             <p:ph type="ctrTitle"/>
@@ -3252,7 +3252,7 @@
       </p:sp>
       <p:sp>
         <p:nvSpPr>
-          <p:cNvPr id="152" name="Body"/>
+          <p:cNvPr id="157" name="Body"/>
           <p:cNvSpPr txBox="1"/>
           <p:nvPr>
             <p:ph type="subTitle" sz="quarter" idx="1"/>
@@ -3370,7 +3370,7 @@
         </p:nvSpPr>
         <p:spPr>
           <a:xfrm>
-            <a:off x="-23402" y="6852112"/>
+            <a:off x="8848" y="6561865"/>
             <a:ext cx="13309601" cy="3409982"/>
           </a:xfrm>
           <a:prstGeom prst="rect">
@@ -3471,11 +3471,11 @@
             </a:r>
             <a:br/>
             <a:r>
-              <a:t>     Практически у каждой станции метро в Москве открылось заведение, </a:t>
+              <a:t>     Практически у каждой станции метро в Москве </a:t>
             </a:r>
             <a:br/>
             <a:r>
-              <a:t>     в котором можно сделать ставки на спорт</a:t>
+              <a:t>     открылась букмекерская контора</a:t>
             </a:r>
             <a:br/>
             <a:br/>
@@ -3490,7 +3490,7 @@
         </p:nvSpPr>
         <p:spPr>
           <a:xfrm>
-            <a:off x="9912740" y="8851510"/>
+            <a:off x="9944990" y="8867635"/>
             <a:ext cx="3107857" cy="305587"/>
           </a:xfrm>
           <a:prstGeom prst="rect">
@@ -3708,7 +3708,7 @@
       </p:sp>
       <p:sp>
         <p:nvSpPr>
-          <p:cNvPr id="133" name="Использование blockchain технологи, а в частности смарт-контрактов, позволяет избавить пользователя от нежелательного риска, проверить коэффициенты исхода игр самостоятельно."/>
+          <p:cNvPr id="133" name="Использование blockchain технологи, а в частности смарт-контрактов, позволяет избавить пользователя от нежелательного риска, проверить коэффициенты исхода игр."/>
           <p:cNvSpPr txBox="1"/>
           <p:nvPr>
             <p:ph type="subTitle" sz="quarter" idx="1"/>
@@ -3733,7 +3733,7 @@
           <a:p>
             <a:pPr/>
             <a:r>
-              <a:t>Использование blockchain технологи, а в частности смарт-контрактов, позволяет избавить пользователя от нежелательного риска, проверить коэффициенты исхода игр самостоятельно.</a:t>
+              <a:t>Использование blockchain технологи, а в частности смарт-контрактов, позволяет избавить пользователя от нежелательного риска, проверить коэффициенты исхода игр.</a:t>
             </a:r>
           </a:p>
         </p:txBody>
@@ -3819,7 +3819,7 @@
       </p:sp>
       <p:sp>
         <p:nvSpPr>
-          <p:cNvPr id="137" name="Body"/>
+          <p:cNvPr id="137" name="About smart contracts"/>
           <p:cNvSpPr txBox="1"/>
           <p:nvPr>
             <p:ph type="subTitle" sz="quarter" idx="1"/>
@@ -3835,6 +3835,9 @@
           <a:lstStyle/>
           <a:p>
             <a:pPr/>
+            <a:r>
+              <a:t>About smart contracts</a:t>
+            </a:r>
           </a:p>
         </p:txBody>
       </p:sp>
@@ -3890,7 +3893,7 @@
       </p:sp>
       <p:sp>
         <p:nvSpPr>
-          <p:cNvPr id="140" name="Body"/>
+          <p:cNvPr id="140" name="About our smart contract smart, maybe 2 slides"/>
           <p:cNvSpPr txBox="1"/>
           <p:nvPr>
             <p:ph type="subTitle" sz="quarter" idx="1"/>
@@ -3906,6 +3909,9 @@
           <a:lstStyle/>
           <a:p>
             <a:pPr/>
+            <a:r>
+              <a:t>About our smart contract smart, maybe 2 slides</a:t>
+            </a:r>
           </a:p>
         </p:txBody>
       </p:sp>
@@ -3937,13 +3943,17 @@
       </p:grpSpPr>
       <p:sp>
         <p:nvSpPr>
-          <p:cNvPr id="142" name="Работоспособность MVP"/>
+          <p:cNvPr id="142" name="MVP (add slides)"/>
           <p:cNvSpPr txBox="1"/>
           <p:nvPr>
             <p:ph type="ctrTitle"/>
           </p:nvPr>
         </p:nvSpPr>
         <p:spPr>
+          <a:xfrm>
+            <a:off x="1270000" y="-1715671"/>
+            <a:ext cx="10464801" cy="3302001"/>
+          </a:xfrm>
           <a:prstGeom prst="rect">
             <a:avLst/>
           </a:prstGeom>
@@ -3954,20 +3964,24 @@
           <a:p>
             <a:pPr/>
             <a:r>
-              <a:t>Работоспособность MVP</a:t>
+              <a:t>MVP (add slides)</a:t>
             </a:r>
           </a:p>
         </p:txBody>
       </p:sp>
       <p:sp>
         <p:nvSpPr>
-          <p:cNvPr id="143" name="Body"/>
+          <p:cNvPr id="143" name="https://github.com/padap/hse_smart_contracts"/>
           <p:cNvSpPr txBox="1"/>
           <p:nvPr>
             <p:ph type="subTitle" sz="quarter" idx="1"/>
           </p:nvPr>
         </p:nvSpPr>
         <p:spPr>
+          <a:xfrm>
+            <a:off x="1270000" y="1675229"/>
+            <a:ext cx="10464801" cy="1130301"/>
+          </a:xfrm>
           <a:prstGeom prst="rect">
             <a:avLst/>
           </a:prstGeom>
@@ -3977,9 +3991,41 @@
           <a:lstStyle/>
           <a:p>
             <a:pPr/>
+            <a:r>
+              <a:t>https://github.com/padap/hse_smart_contracts</a:t>
+            </a:r>
           </a:p>
         </p:txBody>
       </p:sp>
+      <p:pic>
+        <p:nvPicPr>
+          <p:cNvPr id="144" name="Screen Shot 2018-12-24 at 8.18.18 PM.png" descr="Screen Shot 2018-12-24 at 8.18.18 PM.png"/>
+          <p:cNvPicPr>
+            <a:picLocks noChangeAspect="1"/>
+          </p:cNvPicPr>
+          <p:nvPr/>
+        </p:nvPicPr>
+        <p:blipFill>
+          <a:blip r:embed="rId2">
+            <a:extLst/>
+          </a:blip>
+          <a:stretch>
+            <a:fillRect/>
+          </a:stretch>
+        </p:blipFill>
+        <p:spPr>
+          <a:xfrm>
+            <a:off x="0" y="2667943"/>
+            <a:ext cx="13004801" cy="7206482"/>
+          </a:xfrm>
+          <a:prstGeom prst="rect">
+            <a:avLst/>
+          </a:prstGeom>
+          <a:ln w="12700">
+            <a:miter lim="400000"/>
+          </a:ln>
+        </p:spPr>
+      </p:pic>
     </p:spTree>
   </p:cSld>
   <p:clrMapOvr>
@@ -4008,41 +4054,45 @@
       </p:grpSpPr>
       <p:sp>
         <p:nvSpPr>
-          <p:cNvPr id="145" name="Заключение, что еще необходимо сделать"/>
+          <p:cNvPr id="146" name="Дальнейшие улучшения"/>
           <p:cNvSpPr txBox="1"/>
           <p:nvPr>
             <p:ph type="ctrTitle"/>
           </p:nvPr>
         </p:nvSpPr>
         <p:spPr>
+          <a:xfrm>
+            <a:off x="-987481" y="122563"/>
+            <a:ext cx="10464801" cy="3302001"/>
+          </a:xfrm>
           <a:prstGeom prst="rect">
             <a:avLst/>
           </a:prstGeom>
         </p:spPr>
         <p:txBody>
           <a:bodyPr/>
-          <a:lstStyle>
-            <a:lvl1pPr defTabSz="560831">
-              <a:defRPr sz="7679"/>
-            </a:lvl1pPr>
-          </a:lstStyle>
+          <a:lstStyle/>
           <a:p>
             <a:pPr/>
             <a:r>
-              <a:t>Заключение, что еще необходимо сделать</a:t>
+              <a:t>Дальнейшие улучшения</a:t>
             </a:r>
           </a:p>
         </p:txBody>
       </p:sp>
       <p:sp>
         <p:nvSpPr>
-          <p:cNvPr id="146" name="Body"/>
+          <p:cNvPr id="147" name="- Продвинутая система ставок…"/>
           <p:cNvSpPr txBox="1"/>
           <p:nvPr>
-            <p:ph type="subTitle" sz="quarter" idx="1"/>
+            <p:ph type="subTitle" sz="half" idx="1"/>
           </p:nvPr>
         </p:nvSpPr>
         <p:spPr>
+          <a:xfrm>
+            <a:off x="544381" y="6673935"/>
+            <a:ext cx="10464801" cy="4410009"/>
+          </a:xfrm>
           <a:prstGeom prst="rect">
             <a:avLst/>
           </a:prstGeom>
@@ -4051,10 +4101,54 @@
           <a:bodyPr/>
           <a:lstStyle/>
           <a:p>
-            <a:pPr/>
+            <a:pPr algn="l"/>
+            <a:r>
+              <a:t>- Продвинутая система ставок</a:t>
+            </a:r>
+          </a:p>
+          <a:p>
+            <a:pPr algn="l"/>
+            <a:r>
+              <a:t>- Приятный front интерфейс</a:t>
+            </a:r>
+          </a:p>
+          <a:p>
+            <a:pPr algn="l"/>
+            <a:r>
+              <a:t>- Решение проблемы с oracle</a:t>
+            </a:r>
           </a:p>
         </p:txBody>
       </p:sp>
+      <p:pic>
+        <p:nvPicPr>
+          <p:cNvPr id="148" name="app-144.png" descr="app-144.png"/>
+          <p:cNvPicPr>
+            <a:picLocks noChangeAspect="1"/>
+          </p:cNvPicPr>
+          <p:nvPr/>
+        </p:nvPicPr>
+        <p:blipFill>
+          <a:blip r:embed="rId2">
+            <a:extLst/>
+          </a:blip>
+          <a:stretch>
+            <a:fillRect/>
+          </a:stretch>
+        </p:blipFill>
+        <p:spPr>
+          <a:xfrm>
+            <a:off x="8383389" y="176277"/>
+            <a:ext cx="4191570" cy="4191570"/>
+          </a:xfrm>
+          <a:prstGeom prst="rect">
+            <a:avLst/>
+          </a:prstGeom>
+          <a:ln w="12700">
+            <a:miter lim="400000"/>
+          </a:ln>
+        </p:spPr>
+      </p:pic>
     </p:spTree>
   </p:cSld>
   <p:clrMapOvr>
@@ -4081,48 +4175,182 @@
           <a:chExt cx="0" cy="0"/>
         </a:xfrm>
       </p:grpSpPr>
+      <p:pic>
+        <p:nvPicPr>
+          <p:cNvPr id="150" name="fon2.png" descr="fon2.png"/>
+          <p:cNvPicPr>
+            <a:picLocks noChangeAspect="1"/>
+          </p:cNvPicPr>
+          <p:nvPr/>
+        </p:nvPicPr>
+        <p:blipFill>
+          <a:blip r:embed="rId2">
+            <a:extLst/>
+          </a:blip>
+          <a:stretch>
+            <a:fillRect/>
+          </a:stretch>
+        </p:blipFill>
+        <p:spPr>
+          <a:xfrm>
+            <a:off x="6981858" y="-3385705"/>
+            <a:ext cx="6554869" cy="4503896"/>
+          </a:xfrm>
+          <a:prstGeom prst="rect">
+            <a:avLst/>
+          </a:prstGeom>
+          <a:ln w="12700">
+            <a:miter lim="400000"/>
+          </a:ln>
+        </p:spPr>
+      </p:pic>
+      <p:pic>
+        <p:nvPicPr>
+          <p:cNvPr id="151" name="fon2.png" descr="fon2.png"/>
+          <p:cNvPicPr>
+            <a:picLocks noChangeAspect="1"/>
+          </p:cNvPicPr>
+          <p:nvPr/>
+        </p:nvPicPr>
+        <p:blipFill>
+          <a:blip r:embed="rId2">
+            <a:extLst/>
+          </a:blip>
+          <a:stretch>
+            <a:fillRect/>
+          </a:stretch>
+        </p:blipFill>
+        <p:spPr>
+          <a:xfrm>
+            <a:off x="6641237" y="1037352"/>
+            <a:ext cx="6554869" cy="4503896"/>
+          </a:xfrm>
+          <a:prstGeom prst="rect">
+            <a:avLst/>
+          </a:prstGeom>
+          <a:ln w="12700">
+            <a:miter lim="400000"/>
+          </a:ln>
+        </p:spPr>
+      </p:pic>
+      <p:pic>
+        <p:nvPicPr>
+          <p:cNvPr id="152" name="fon2.png" descr="fon2.png"/>
+          <p:cNvPicPr>
+            <a:picLocks noChangeAspect="1"/>
+          </p:cNvPicPr>
+          <p:nvPr/>
+        </p:nvPicPr>
+        <p:blipFill>
+          <a:blip r:embed="rId2">
+            <a:extLst/>
+          </a:blip>
+          <a:stretch>
+            <a:fillRect/>
+          </a:stretch>
+        </p:blipFill>
+        <p:spPr>
+          <a:xfrm>
+            <a:off x="465417" y="514512"/>
+            <a:ext cx="6554868" cy="4503895"/>
+          </a:xfrm>
+          <a:prstGeom prst="rect">
+            <a:avLst/>
+          </a:prstGeom>
+          <a:ln w="12700">
+            <a:miter lim="400000"/>
+          </a:ln>
+        </p:spPr>
+      </p:pic>
       <p:sp>
         <p:nvSpPr>
-          <p:cNvPr id="148" name="Спасибо за внимание!"/>
+          <p:cNvPr id="153" name="Title"/>
           <p:cNvSpPr txBox="1"/>
           <p:nvPr>
             <p:ph type="ctrTitle"/>
           </p:nvPr>
         </p:nvSpPr>
         <p:spPr>
-          <a:prstGeom prst="rect">
-            <a:avLst/>
-          </a:prstGeom>
+          <a:xfrm>
+            <a:off x="-91159" y="6508007"/>
+            <a:ext cx="13187119" cy="3302001"/>
+          </a:xfrm>
+          <a:prstGeom prst="rect">
+            <a:avLst/>
+          </a:prstGeom>
+          <a:gradFill>
+            <a:gsLst>
+              <a:gs pos="0">
+                <a:schemeClr val="accent1">
+                  <a:lumOff val="13529"/>
+                </a:schemeClr>
+              </a:gs>
+              <a:gs pos="100000">
+                <a:srgbClr val="000000"/>
+              </a:gs>
+            </a:gsLst>
+            <a:lin ang="16315851"/>
+          </a:gradFill>
         </p:spPr>
         <p:txBody>
-          <a:bodyPr/>
-          <a:lstStyle/>
+          <a:bodyPr lIns="457200" tIns="457200" rIns="457200" bIns="457200">
+            <a:noAutofit/>
+          </a:bodyPr>
+          <a:lstStyle>
+            <a:lvl1pPr>
+              <a:defRPr sz="2200"/>
+            </a:lvl1pPr>
+          </a:lstStyle>
           <a:p>
             <a:pPr/>
             <a:r>
-              <a:t>Спасибо за внимание!</a:t>
+              <a:t> </a:t>
             </a:r>
           </a:p>
         </p:txBody>
       </p:sp>
       <p:sp>
         <p:nvSpPr>
-          <p:cNvPr id="149" name="Body"/>
+          <p:cNvPr id="154" name="Спасибо за внимание!"/>
           <p:cNvSpPr txBox="1"/>
-          <p:nvPr>
-            <p:ph type="subTitle" sz="quarter" idx="1"/>
-          </p:nvPr>
+          <p:nvPr/>
         </p:nvSpPr>
         <p:spPr>
-          <a:prstGeom prst="rect">
-            <a:avLst/>
-          </a:prstGeom>
+          <a:xfrm>
+            <a:off x="2839579" y="5354402"/>
+            <a:ext cx="12421097" cy="3302001"/>
+          </a:xfrm>
+          <a:prstGeom prst="rect">
+            <a:avLst/>
+          </a:prstGeom>
+          <a:ln w="12700">
+            <a:miter lim="400000"/>
+          </a:ln>
+          <a:extLst>
+            <a:ext uri="{C572A759-6A51-4108-AA02-DFA0A04FC94B}">
+              <ma14:wrappingTextBoxFlag xmlns:ma14="http://schemas.microsoft.com/office/mac/drawingml/2011/main" val="1"/>
+            </a:ext>
+          </a:extLst>
         </p:spPr>
         <p:txBody>
-          <a:bodyPr/>
-          <a:lstStyle/>
+          <a:bodyPr lIns="114300" tIns="114300" rIns="114300" bIns="114300" anchor="b">
+            <a:normAutofit fontScale="100000" lnSpcReduction="0"/>
+          </a:bodyPr>
+          <a:lstStyle>
+            <a:lvl1pPr algn="l">
+              <a:defRPr b="0" sz="5000">
+                <a:latin typeface="+mn-lt"/>
+                <a:ea typeface="+mn-ea"/>
+                <a:cs typeface="+mn-cs"/>
+                <a:sym typeface="Helvetica Neue Medium"/>
+              </a:defRPr>
+            </a:lvl1pPr>
+          </a:lstStyle>
           <a:p>
             <a:pPr/>
+            <a:r>
+              <a:t>Спасибо за внимание!</a:t>
+            </a:r>
           </a:p>
         </p:txBody>
       </p:sp>

</xml_diff>